<commit_message>
2 Questions added to RECAP
</commit_message>
<xml_diff>
--- a/INTRO Recap – SW04.pptx
+++ b/INTRO Recap – SW04.pptx
@@ -5,10 +5,10 @@
     <p:sldMasterId id="2147483648" r:id="rId4"/>
   </p:sldMasterIdLst>
   <p:notesMasterIdLst>
-    <p:notesMasterId r:id="rId17"/>
+    <p:notesMasterId r:id="rId19"/>
   </p:notesMasterIdLst>
   <p:handoutMasterIdLst>
-    <p:handoutMasterId r:id="rId18"/>
+    <p:handoutMasterId r:id="rId20"/>
   </p:handoutMasterIdLst>
   <p:sldIdLst>
     <p:sldId id="256" r:id="rId5"/>
@@ -23,12 +23,14 @@
     <p:sldId id="273" r:id="rId14"/>
     <p:sldId id="274" r:id="rId15"/>
     <p:sldId id="275" r:id="rId16"/>
+    <p:sldId id="276" r:id="rId17"/>
+    <p:sldId id="277" r:id="rId18"/>
   </p:sldIdLst>
   <p:sldSz cx="12192000" cy="6858000"/>
   <p:notesSz cx="6858000" cy="9144000"/>
   <p:defaultTextStyle>
     <a:defPPr rtl="0">
-      <a:defRPr lang="de-de"/>
+      <a:defRPr lang="x-none"/>
     </a:defPPr>
     <a:lvl1pPr marL="0" algn="l" defTabSz="914400" rtl="0" eaLnBrk="1" latinLnBrk="0" hangingPunct="1">
       <a:defRPr sz="1800" kern="1200">
@@ -231,7 +233,7 @@
             <a:pPr algn="r" rtl="0"/>
             <a:fld id="{2A36C307-EE12-444D-9D2F-BC7831E9DF94}" type="datetime1">
               <a:rPr lang="de-DE" smtClean="0"/>
-              <a:t>17.10.2017</a:t>
+              <a:t>17.10.17</a:t>
             </a:fld>
             <a:endParaRPr lang="de-DE" dirty="0"/>
           </a:p>
@@ -339,7 +341,6 @@
       <inkml:brushProperty name="color" value="#00FFFF"/>
       <inkml:brushProperty name="tip" value="rectangle"/>
       <inkml:brushProperty name="rasterOp" value="maskPen"/>
-      <inkml:brushProperty name="ignorePressure" value="1"/>
     </inkml:brush>
   </inkml:definitions>
   <inkml:trace contextRef="#ctx0" brushRef="#br0">1 74,'4'0,"5"0,14 0,7 0,2 0,0 0,-2 0,3 0,-1 0,-5-4,-4-2,-1 1,0 1,3 1,3 1,0 1,-1 1,0 0,6 0,3 0,3 1,-1-1,1 0,-2 0,-3 0,-3 0,-4-4,-1-2,3 1,0 1,-5-3,-2 0,-1 1,1 1,-1 2,2 1,0 2,-4 0</inkml:trace>
@@ -368,7 +369,6 @@
       <inkml:brushProperty name="color" value="#00FFFF"/>
       <inkml:brushProperty name="tip" value="rectangle"/>
       <inkml:brushProperty name="rasterOp" value="maskPen"/>
-      <inkml:brushProperty name="ignorePressure" value="1"/>
     </inkml:brush>
   </inkml:definitions>
   <inkml:trace contextRef="#ctx0" brushRef="#br0">0 1,'4'0,"6"0,8 0,15 0,5 0,4 0,-1 0,1 4,-3 1,-3 0,-5-1,-3-1,-2-1,-2-1,0 0,-1-1,0-1,1 1,-1 0,1 4,0 1,-1 0,1-1,0-1,0-1,0-1,0 4,0 0,0 0,0-1,-4-1</inkml:trace>
@@ -397,7 +397,6 @@
       <inkml:brushProperty name="color" value="#00FF00"/>
       <inkml:brushProperty name="tip" value="rectangle"/>
       <inkml:brushProperty name="rasterOp" value="maskPen"/>
-      <inkml:brushProperty name="ignorePressure" value="1"/>
     </inkml:brush>
   </inkml:definitions>
   <inkml:trace contextRef="#ctx0" brushRef="#br0">1 1,'4'0,"9"0,7 0,4 0,2 0,1 0,-1 0,0 0,0 0,-1 0,-1 0,0 0,0 0,0 0,0 0,0 0,4 0,1 0,0 0,-1 0,-5 4,-3 1,0 1,0-2,1-1,5 3,3 0,-5 4,3-1,0-1,0-2,-1-2,0-2,-1-1,-5-1</inkml:trace>
@@ -426,7 +425,6 @@
       <inkml:brushProperty name="color" value="#00FF00"/>
       <inkml:brushProperty name="tip" value="rectangle"/>
       <inkml:brushProperty name="rasterOp" value="maskPen"/>
-      <inkml:brushProperty name="ignorePressure" value="1"/>
     </inkml:brush>
   </inkml:definitions>
   <inkml:trace contextRef="#ctx0" brushRef="#br0">0 1,'4'0,"10"0,10 0,10 0,2 0,0 4,-2 1,-4 0,-1-1,-3-1,3-1,0-1,0 0,-2-1,0-1,-2 1,4 0,1 0,-1 0,-2 0,0 0,-1 0,-1 0,-1 0,0 0,-1 4,1 1,0 0,0-1,0-1,-5-1</inkml:trace>
@@ -455,7 +453,6 @@
       <inkml:brushProperty name="color" value="#FF00FF"/>
       <inkml:brushProperty name="tip" value="rectangle"/>
       <inkml:brushProperty name="rasterOp" value="maskPen"/>
-      <inkml:brushProperty name="ignorePressure" value="1"/>
     </inkml:brush>
   </inkml:definitions>
   <inkml:trace contextRef="#ctx0" brushRef="#br0">0 0,'4'0,"6"0,13 4,6 6,8 0,4 0,4-3,3-2,-4-3,-4 0,-5-2,-5 4,-3 1,-2 0,-2-1,0-2,0 0,0-1,5-1,1 0,-1 0,0 0,-1-1,-1 1,-1 0,-1 0,1 0,-2 0,5 0,1 0,0 0,-1 0,-1 0,-5 0</inkml:trace>
@@ -484,7 +481,6 @@
       <inkml:brushProperty name="color" value="#FF00FF"/>
       <inkml:brushProperty name="tip" value="rectangle"/>
       <inkml:brushProperty name="rasterOp" value="maskPen"/>
-      <inkml:brushProperty name="ignorePressure" value="1"/>
     </inkml:brush>
   </inkml:definitions>
   <inkml:trace contextRef="#ctx0" brushRef="#br0">0 1,'4'0,"6"0,4 0,9 0,13 0,7 0,10 0,7 0,3 0,-3 0,-2 0,-8 0,-7 0,-8 0,-5 0,-4 0,-3 0,4 0,1 0,0 0,-1 0,-1 0,-1 0,0 0,-1 0,0 0,-4 0</inkml:trace>
@@ -513,7 +509,6 @@
       <inkml:brushProperty name="color" value="#FF7321"/>
       <inkml:brushProperty name="tip" value="rectangle"/>
       <inkml:brushProperty name="rasterOp" value="maskPen"/>
-      <inkml:brushProperty name="ignorePressure" value="1"/>
     </inkml:brush>
   </inkml:definitions>
   <inkml:trace contextRef="#ctx0" brushRef="#br0">1 0,'4'0,"5"0,10 0,9 0,5 0,0 0,-2 0,-1 0,-2 0,-2 0,-1 0,8 0,5 0,2 0,1 0,-2 0,5 0,-2 0,-3 0,0 0,-3 0,0 0,3 0,-1 0,-4 0,-3 0,-2 4,-3 2,-1-1,-2-1,1-1,-5-1</inkml:trace>
@@ -542,7 +537,6 @@
       <inkml:brushProperty name="color" value="#FF7321"/>
       <inkml:brushProperty name="tip" value="rectangle"/>
       <inkml:brushProperty name="rasterOp" value="maskPen"/>
-      <inkml:brushProperty name="ignorePressure" value="1"/>
     </inkml:brush>
   </inkml:definitions>
   <inkml:trace contextRef="#ctx0" brushRef="#br0">0 1,'9'0,"5"0,6 0,7 0,4 0,-1 0,4 0,8 0,9 0,4 0,1 0,-5 0,-8 0,-6 0,-1 4,0 1,-1 0,-2 0,-3-3,-3 0,3-1,4 0,0-1,3 4,-1 1,-3 0,-6-1</inkml:trace>
@@ -633,7 +627,7 @@
             <a:fld id="{FFBFC375-E15A-4071-A304-01F7D634EE71}" type="datetime1">
               <a:rPr lang="de-DE" smtClean="0"/>
               <a:pPr/>
-              <a:t>17.10.2017</a:t>
+              <a:t>17.10.17</a:t>
             </a:fld>
             <a:endParaRPr lang="de-DE" dirty="0"/>
           </a:p>
@@ -1276,7 +1270,7 @@
             <a:fld id="{571E88B6-FE14-41E8-AE28-1BB272040B8F}" type="datetime1">
               <a:rPr lang="de-DE" smtClean="0"/>
               <a:pPr/>
-              <a:t>17.10.2017</a:t>
+              <a:t>17.10.17</a:t>
             </a:fld>
             <a:endParaRPr lang="en-US" dirty="0"/>
           </a:p>
@@ -1464,7 +1458,7 @@
             <a:fld id="{524C3C4B-5AFC-4292-97F6-BEE5884FBE39}" type="datetime1">
               <a:rPr lang="de-DE" smtClean="0"/>
               <a:pPr/>
-              <a:t>17.10.2017</a:t>
+              <a:t>17.10.17</a:t>
             </a:fld>
             <a:endParaRPr lang="en-US" dirty="0"/>
           </a:p>
@@ -1645,7 +1639,7 @@
             <a:fld id="{303070AA-3D07-474E-8754-182567C134AA}" type="datetime1">
               <a:rPr lang="de-DE" smtClean="0"/>
               <a:pPr/>
-              <a:t>17.10.2017</a:t>
+              <a:t>17.10.17</a:t>
             </a:fld>
             <a:endParaRPr lang="de-DE" dirty="0"/>
           </a:p>
@@ -2089,7 +2083,7 @@
             <a:fld id="{CDDDF17E-10B7-4877-A125-E500D2B28F23}" type="datetime1">
               <a:rPr lang="de-DE" smtClean="0"/>
               <a:pPr/>
-              <a:t>17.10.2017</a:t>
+              <a:t>17.10.17</a:t>
             </a:fld>
             <a:endParaRPr lang="en-US" dirty="0"/>
           </a:p>
@@ -2538,7 +2532,7 @@
             <a:fld id="{3916AFE4-10B6-4D09-B50E-4CC7E64B8339}" type="datetime1">
               <a:rPr lang="de" smtClean="0"/>
               <a:pPr algn="r"/>
-              <a:t>17.10.2017</a:t>
+              <a:t>17.10.17</a:t>
             </a:fld>
             <a:r>
               <a:rPr lang="en-US" dirty="0"/>
@@ -2667,7 +2661,7 @@
             <a:fld id="{FBF3D107-218B-4587-97C4-CC701AE1B579}" type="datetime1">
               <a:rPr lang="de-DE" smtClean="0"/>
               <a:pPr/>
-              <a:t>17.10.2017</a:t>
+              <a:t>17.10.17</a:t>
             </a:fld>
             <a:endParaRPr lang="en-US" dirty="0"/>
           </a:p>
@@ -2769,7 +2763,7 @@
             <a:fld id="{AE25A021-56FD-49B4-A571-6DAF69925246}" type="datetime1">
               <a:rPr lang="de-DE" smtClean="0"/>
               <a:pPr/>
-              <a:t>17.10.2017</a:t>
+              <a:t>17.10.17</a:t>
             </a:fld>
             <a:endParaRPr lang="en-US" dirty="0"/>
           </a:p>
@@ -3061,7 +3055,7 @@
             <a:fld id="{BE527D01-F67C-4708-BC00-4C6F32DCB8AA}" type="datetime1">
               <a:rPr lang="de-DE" smtClean="0"/>
               <a:pPr/>
-              <a:t>17.10.2017</a:t>
+              <a:t>17.10.17</a:t>
             </a:fld>
             <a:endParaRPr lang="en-US" dirty="0"/>
           </a:p>
@@ -3348,7 +3342,7 @@
             <a:fld id="{A6D1EB8E-19B8-4935-8E61-89C5BA894BFB}" type="datetime1">
               <a:rPr lang="de-DE" smtClean="0"/>
               <a:pPr/>
-              <a:t>17.10.2017</a:t>
+              <a:t>17.10.17</a:t>
             </a:fld>
             <a:endParaRPr lang="en-US" dirty="0"/>
           </a:p>
@@ -3598,7 +3592,7 @@
             <a:fld id="{E5AB380B-2572-4069-A693-6E7DF86ABACF}" type="datetime1">
               <a:rPr lang="de-DE" smtClean="0"/>
               <a:pPr/>
-              <a:t>17.10.2017</a:t>
+              <a:t>17.10.17</a:t>
             </a:fld>
             <a:endParaRPr lang="de-DE" dirty="0"/>
           </a:p>
@@ -4164,7 +4158,7 @@
           <p:cNvPr id="2" name="Titel 1">
             <a:extLst>
               <a:ext uri="{FF2B5EF4-FFF2-40B4-BE49-F238E27FC236}">
-                <a16:creationId xmlns:a16="http://schemas.microsoft.com/office/drawing/2014/main" id="{0572EF2B-C8A0-48D8-9307-F6A9D11AE3F2}"/>
+                <a16:creationId xmlns:a16="http://schemas.microsoft.com/office/drawing/2014/main" xmlns="" id="{0572EF2B-C8A0-48D8-9307-F6A9D11AE3F2}"/>
               </a:ext>
             </a:extLst>
           </p:cNvPr>
@@ -4192,7 +4186,7 @@
           <p:cNvPr id="3" name="Inhaltsplatzhalter 2">
             <a:extLst>
               <a:ext uri="{FF2B5EF4-FFF2-40B4-BE49-F238E27FC236}">
-                <a16:creationId xmlns:a16="http://schemas.microsoft.com/office/drawing/2014/main" id="{7B362E48-D48B-4AEF-872E-A51159F8C485}"/>
+                <a16:creationId xmlns:a16="http://schemas.microsoft.com/office/drawing/2014/main" xmlns="" id="{7B362E48-D48B-4AEF-872E-A51159F8C485}"/>
               </a:ext>
             </a:extLst>
           </p:cNvPr>
@@ -4205,7 +4199,9 @@
         </p:nvSpPr>
         <p:spPr/>
         <p:txBody>
-          <a:bodyPr/>
+          <a:bodyPr>
+            <a:normAutofit fontScale="92500" lnSpcReduction="10000"/>
+          </a:bodyPr>
           <a:lstStyle/>
           <a:p>
             <a:r>
@@ -4257,20 +4253,88 @@
           <a:p>
             <a:pPr lvl="1"/>
             <a:r>
+              <a:rPr lang="en-US" dirty="0" smtClean="0">
+                <a:solidFill>
+                  <a:schemeClr val="bg1"/>
+                </a:solidFill>
+              </a:rPr>
+              <a:t> </a:t>
+            </a:r>
+            <a:r>
               <a:rPr lang="en-US" dirty="0">
                 <a:solidFill>
                   <a:schemeClr val="bg1"/>
                 </a:solidFill>
               </a:rPr>
-              <a:t>No global variable needed</a:t>
-            </a:r>
+              <a:t>No global variable </a:t>
+            </a:r>
+            <a:r>
+              <a:rPr lang="en-US" dirty="0" smtClean="0">
+                <a:solidFill>
+                  <a:schemeClr val="bg1"/>
+                </a:solidFill>
+              </a:rPr>
+              <a:t>needed</a:t>
+            </a:r>
+            <a:endParaRPr lang="en-US" dirty="0" smtClean="0">
+              <a:solidFill>
+                <a:schemeClr val="bg1"/>
+              </a:solidFill>
+            </a:endParaRPr>
+          </a:p>
+          <a:p>
+            <a:r>
+              <a:rPr lang="en-US" dirty="0" smtClean="0"/>
+              <a:t>Which state </a:t>
+            </a:r>
+            <a:r>
+              <a:rPr lang="en-US" dirty="0"/>
+              <a:t>m</a:t>
+            </a:r>
+            <a:r>
+              <a:rPr lang="en-US" dirty="0" smtClean="0"/>
+              <a:t>achine is the simplest to implement from a Table?</a:t>
+            </a:r>
+          </a:p>
+          <a:p>
+            <a:pPr lvl="1"/>
+            <a:r>
+              <a:rPr lang="en-US" dirty="0" smtClean="0">
+                <a:solidFill>
+                  <a:schemeClr val="bg1"/>
+                </a:solidFill>
+              </a:rPr>
+              <a:t>Mealy Sequential Machine</a:t>
+            </a:r>
+          </a:p>
+          <a:p>
+            <a:r>
+              <a:rPr lang="en-US" dirty="0" smtClean="0"/>
+              <a:t>How we can realize many different timer in our project with just one time base?</a:t>
+            </a:r>
+          </a:p>
+          <a:p>
+            <a:pPr lvl="1"/>
+            <a:r>
+              <a:rPr lang="en-US" dirty="0" smtClean="0">
+                <a:solidFill>
+                  <a:schemeClr val="bg1"/>
+                </a:solidFill>
+              </a:rPr>
+              <a:t>With counter</a:t>
+            </a:r>
+            <a:endParaRPr lang="en-US" dirty="0">
+              <a:solidFill>
+                <a:schemeClr val="bg1"/>
+              </a:solidFill>
+            </a:endParaRPr>
           </a:p>
         </p:txBody>
       </p:sp>
     </p:spTree>
     <p:extLst>
       <p:ext uri="{BB962C8B-B14F-4D97-AF65-F5344CB8AC3E}">
-        <p14:creationId xmlns:p14="http://schemas.microsoft.com/office/powerpoint/2010/main" val="4157674496"/>
+        <p14:creationId xmlns:p14="http://schemas.microsoft.com/office/powerpoint/2010/main" val="544998136"/>
       </p:ext>
     </p:extLst>
   </p:cSld>
@@ -4302,7 +4366,7 @@
           <p:cNvPr id="2" name="Titel 1">
             <a:extLst>
               <a:ext uri="{FF2B5EF4-FFF2-40B4-BE49-F238E27FC236}">
-                <a16:creationId xmlns:a16="http://schemas.microsoft.com/office/drawing/2014/main" id="{0572EF2B-C8A0-48D8-9307-F6A9D11AE3F2}"/>
+                <a16:creationId xmlns:a16="http://schemas.microsoft.com/office/drawing/2014/main" xmlns="" id="{0572EF2B-C8A0-48D8-9307-F6A9D11AE3F2}"/>
               </a:ext>
             </a:extLst>
           </p:cNvPr>
@@ -4330,7 +4394,7 @@
           <p:cNvPr id="3" name="Inhaltsplatzhalter 2">
             <a:extLst>
               <a:ext uri="{FF2B5EF4-FFF2-40B4-BE49-F238E27FC236}">
-                <a16:creationId xmlns:a16="http://schemas.microsoft.com/office/drawing/2014/main" id="{7B362E48-D48B-4AEF-872E-A51159F8C485}"/>
+                <a16:creationId xmlns:a16="http://schemas.microsoft.com/office/drawing/2014/main" xmlns="" id="{7B362E48-D48B-4AEF-872E-A51159F8C485}"/>
               </a:ext>
             </a:extLst>
           </p:cNvPr>
@@ -4343,7 +4407,9 @@
         </p:nvSpPr>
         <p:spPr/>
         <p:txBody>
-          <a:bodyPr/>
+          <a:bodyPr>
+            <a:normAutofit fontScale="92500" lnSpcReduction="10000"/>
+          </a:bodyPr>
           <a:lstStyle/>
           <a:p>
             <a:r>
@@ -4386,21 +4452,89 @@
           </a:p>
           <a:p>
             <a:pPr lvl="1"/>
+            <a:r>
+              <a:rPr lang="en-US" dirty="0" smtClean="0">
+                <a:solidFill>
+                  <a:schemeClr val="bg1"/>
+                </a:solidFill>
+              </a:rPr>
+              <a:t> </a:t>
+            </a:r>
             <a:r>
               <a:rPr lang="en-US" dirty="0">
                 <a:solidFill>
                   <a:schemeClr val="bg1"/>
                 </a:solidFill>
               </a:rPr>
-              <a:t>No global variable needed</a:t>
-            </a:r>
+              <a:t>No global variable </a:t>
+            </a:r>
+            <a:r>
+              <a:rPr lang="en-US" dirty="0" smtClean="0">
+                <a:solidFill>
+                  <a:schemeClr val="bg1"/>
+                </a:solidFill>
+              </a:rPr>
+              <a:t>needed</a:t>
+            </a:r>
+            <a:endParaRPr lang="en-US" dirty="0" smtClean="0">
+              <a:solidFill>
+                <a:schemeClr val="bg1"/>
+              </a:solidFill>
+            </a:endParaRPr>
+          </a:p>
+          <a:p>
+            <a:r>
+              <a:rPr lang="en-US" dirty="0" smtClean="0"/>
+              <a:t>Which state </a:t>
+            </a:r>
+            <a:r>
+              <a:rPr lang="en-US" dirty="0"/>
+              <a:t>m</a:t>
+            </a:r>
+            <a:r>
+              <a:rPr lang="en-US" dirty="0" smtClean="0"/>
+              <a:t>achine is the simplest to implement from a Table?</a:t>
+            </a:r>
+          </a:p>
+          <a:p>
+            <a:pPr lvl="1"/>
+            <a:r>
+              <a:rPr lang="en-US" dirty="0" smtClean="0">
+                <a:solidFill>
+                  <a:schemeClr val="bg1"/>
+                </a:solidFill>
+              </a:rPr>
+              <a:t>Mealy Sequential Machine</a:t>
+            </a:r>
+          </a:p>
+          <a:p>
+            <a:r>
+              <a:rPr lang="en-US" dirty="0" smtClean="0"/>
+              <a:t>How we can realize many different timer in our project with just one time base?</a:t>
+            </a:r>
+          </a:p>
+          <a:p>
+            <a:pPr lvl="1"/>
+            <a:r>
+              <a:rPr lang="en-US" dirty="0" smtClean="0">
+                <a:solidFill>
+                  <a:schemeClr val="bg1"/>
+                </a:solidFill>
+              </a:rPr>
+              <a:t>With counter</a:t>
+            </a:r>
+            <a:endParaRPr lang="en-US" dirty="0">
+              <a:solidFill>
+                <a:schemeClr val="bg1"/>
+              </a:solidFill>
+            </a:endParaRPr>
           </a:p>
         </p:txBody>
       </p:sp>
     </p:spTree>
     <p:extLst>
       <p:ext uri="{BB962C8B-B14F-4D97-AF65-F5344CB8AC3E}">
-        <p14:creationId xmlns:p14="http://schemas.microsoft.com/office/powerpoint/2010/main" val="2030158187"/>
+        <p14:creationId xmlns:p14="http://schemas.microsoft.com/office/powerpoint/2010/main" val="765917297"/>
       </p:ext>
     </p:extLst>
   </p:cSld>
@@ -4432,7 +4566,7 @@
           <p:cNvPr id="2" name="Titel 1">
             <a:extLst>
               <a:ext uri="{FF2B5EF4-FFF2-40B4-BE49-F238E27FC236}">
-                <a16:creationId xmlns:a16="http://schemas.microsoft.com/office/drawing/2014/main" id="{0572EF2B-C8A0-48D8-9307-F6A9D11AE3F2}"/>
+                <a16:creationId xmlns:a16="http://schemas.microsoft.com/office/drawing/2014/main" xmlns="" id="{0572EF2B-C8A0-48D8-9307-F6A9D11AE3F2}"/>
               </a:ext>
             </a:extLst>
           </p:cNvPr>
@@ -4460,7 +4594,7 @@
           <p:cNvPr id="3" name="Inhaltsplatzhalter 2">
             <a:extLst>
               <a:ext uri="{FF2B5EF4-FFF2-40B4-BE49-F238E27FC236}">
-                <a16:creationId xmlns:a16="http://schemas.microsoft.com/office/drawing/2014/main" id="{7B362E48-D48B-4AEF-872E-A51159F8C485}"/>
+                <a16:creationId xmlns:a16="http://schemas.microsoft.com/office/drawing/2014/main" xmlns="" id="{7B362E48-D48B-4AEF-872E-A51159F8C485}"/>
               </a:ext>
             </a:extLst>
           </p:cNvPr>
@@ -4473,7 +4607,9 @@
         </p:nvSpPr>
         <p:spPr/>
         <p:txBody>
-          <a:bodyPr/>
+          <a:bodyPr>
+            <a:normAutofit fontScale="92500" lnSpcReduction="10000"/>
+          </a:bodyPr>
           <a:lstStyle/>
           <a:p>
             <a:r>
@@ -4517,16 +4653,424 @@
           <a:p>
             <a:pPr lvl="1"/>
             <a:r>
+              <a:rPr lang="en-US" dirty="0" smtClean="0"/>
+              <a:t>No </a:t>
+            </a:r>
+            <a:r>
               <a:rPr lang="en-US" dirty="0"/>
-              <a:t>No global variable needed</a:t>
-            </a:r>
+              <a:t>global variable </a:t>
+            </a:r>
+            <a:r>
+              <a:rPr lang="en-US" dirty="0" smtClean="0"/>
+              <a:t>needed</a:t>
+            </a:r>
+            <a:endParaRPr lang="en-US" dirty="0" smtClean="0"/>
+          </a:p>
+          <a:p>
+            <a:r>
+              <a:rPr lang="en-US" dirty="0" smtClean="0"/>
+              <a:t>Which state </a:t>
+            </a:r>
+            <a:r>
+              <a:rPr lang="en-US" dirty="0"/>
+              <a:t>m</a:t>
+            </a:r>
+            <a:r>
+              <a:rPr lang="en-US" dirty="0" smtClean="0"/>
+              <a:t>achine is the simplest to implement from a Table?</a:t>
+            </a:r>
+          </a:p>
+          <a:p>
+            <a:pPr lvl="1"/>
+            <a:r>
+              <a:rPr lang="en-US" dirty="0" smtClean="0">
+                <a:solidFill>
+                  <a:schemeClr val="bg1"/>
+                </a:solidFill>
+              </a:rPr>
+              <a:t>Mealy Sequential Machine</a:t>
+            </a:r>
+          </a:p>
+          <a:p>
+            <a:r>
+              <a:rPr lang="en-US" dirty="0" smtClean="0"/>
+              <a:t>How we can realize many different timer in our project with just one time base?</a:t>
+            </a:r>
+          </a:p>
+          <a:p>
+            <a:pPr lvl="1"/>
+            <a:r>
+              <a:rPr lang="en-US" dirty="0" smtClean="0">
+                <a:solidFill>
+                  <a:schemeClr val="bg1"/>
+                </a:solidFill>
+              </a:rPr>
+              <a:t>With counter</a:t>
+            </a:r>
+            <a:endParaRPr lang="en-US" dirty="0">
+              <a:solidFill>
+                <a:schemeClr val="bg1"/>
+              </a:solidFill>
+            </a:endParaRPr>
           </a:p>
         </p:txBody>
       </p:sp>
     </p:spTree>
     <p:extLst>
       <p:ext uri="{BB962C8B-B14F-4D97-AF65-F5344CB8AC3E}">
-        <p14:creationId xmlns:p14="http://schemas.microsoft.com/office/powerpoint/2010/main" val="753866700"/>
+        <p14:creationId xmlns:p14="http://schemas.microsoft.com/office/powerpoint/2010/main" val="755030561"/>
+      </p:ext>
+    </p:extLst>
+  </p:cSld>
+  <p:clrMapOvr>
+    <a:masterClrMapping/>
+  </p:clrMapOvr>
+</p:sld>
+</file>
+
+<file path=ppt/slides/slide13.xml><?xml version="1.0" encoding="utf-8"?>
+<p:sld xmlns:a="http://schemas.openxmlformats.org/drawingml/2006/main" xmlns:r="http://schemas.openxmlformats.org/officeDocument/2006/relationships" xmlns:p="http://schemas.openxmlformats.org/presentationml/2006/main">
+  <p:cSld>
+    <p:spTree>
+      <p:nvGrpSpPr>
+        <p:cNvPr id="1" name=""/>
+        <p:cNvGrpSpPr/>
+        <p:nvPr/>
+      </p:nvGrpSpPr>
+      <p:grpSpPr>
+        <a:xfrm>
+          <a:off x="0" y="0"/>
+          <a:ext cx="0" cy="0"/>
+          <a:chOff x="0" y="0"/>
+          <a:chExt cx="0" cy="0"/>
+        </a:xfrm>
+      </p:grpSpPr>
+      <p:sp>
+        <p:nvSpPr>
+          <p:cNvPr id="2" name="Titel 1">
+            <a:extLst>
+              <a:ext uri="{FF2B5EF4-FFF2-40B4-BE49-F238E27FC236}">
+                <a16:creationId xmlns:a16="http://schemas.microsoft.com/office/drawing/2014/main" xmlns="" id="{0572EF2B-C8A0-48D8-9307-F6A9D11AE3F2}"/>
+              </a:ext>
+            </a:extLst>
+          </p:cNvPr>
+          <p:cNvSpPr>
+            <a:spLocks noGrp="1"/>
+          </p:cNvSpPr>
+          <p:nvPr>
+            <p:ph type="title"/>
+          </p:nvPr>
+        </p:nvSpPr>
+        <p:spPr/>
+        <p:txBody>
+          <a:bodyPr/>
+          <a:lstStyle/>
+          <a:p>
+            <a:r>
+              <a:rPr lang="en-US" dirty="0"/>
+              <a:t>Questions</a:t>
+            </a:r>
+          </a:p>
+        </p:txBody>
+      </p:sp>
+      <p:sp>
+        <p:nvSpPr>
+          <p:cNvPr id="3" name="Inhaltsplatzhalter 2">
+            <a:extLst>
+              <a:ext uri="{FF2B5EF4-FFF2-40B4-BE49-F238E27FC236}">
+                <a16:creationId xmlns:a16="http://schemas.microsoft.com/office/drawing/2014/main" xmlns="" id="{7B362E48-D48B-4AEF-872E-A51159F8C485}"/>
+              </a:ext>
+            </a:extLst>
+          </p:cNvPr>
+          <p:cNvSpPr>
+            <a:spLocks noGrp="1"/>
+          </p:cNvSpPr>
+          <p:nvPr>
+            <p:ph idx="1"/>
+          </p:nvPr>
+        </p:nvSpPr>
+        <p:spPr/>
+        <p:txBody>
+          <a:bodyPr>
+            <a:normAutofit fontScale="92500" lnSpcReduction="10000"/>
+          </a:bodyPr>
+          <a:lstStyle/>
+          <a:p>
+            <a:r>
+              <a:rPr lang="en-US" dirty="0"/>
+              <a:t>What is the job of the PLL in a microcontroller?</a:t>
+            </a:r>
+          </a:p>
+          <a:p>
+            <a:pPr lvl="1"/>
+            <a:r>
+              <a:rPr lang="en-US" dirty="0"/>
+              <a:t>Frequency multiplication</a:t>
+            </a:r>
+          </a:p>
+          <a:p>
+            <a:r>
+              <a:rPr lang="en-US" dirty="0"/>
+              <a:t>What two different types of clock sources are available for the system clock?</a:t>
+            </a:r>
+          </a:p>
+          <a:p>
+            <a:pPr lvl="1"/>
+            <a:r>
+              <a:rPr lang="en-US" dirty="0"/>
+              <a:t>Internal Clock</a:t>
+            </a:r>
+          </a:p>
+          <a:p>
+            <a:pPr lvl="1"/>
+            <a:r>
+              <a:rPr lang="en-US" dirty="0"/>
+              <a:t>External Crystal/Oscillator</a:t>
+            </a:r>
+          </a:p>
+          <a:p>
+            <a:r>
+              <a:rPr lang="en-US" dirty="0"/>
+              <a:t>What is the advantage of the function state Machine?</a:t>
+            </a:r>
+          </a:p>
+          <a:p>
+            <a:pPr lvl="1"/>
+            <a:r>
+              <a:rPr lang="en-US" dirty="0" smtClean="0"/>
+              <a:t>No </a:t>
+            </a:r>
+            <a:r>
+              <a:rPr lang="en-US" dirty="0"/>
+              <a:t>global variable </a:t>
+            </a:r>
+            <a:r>
+              <a:rPr lang="en-US" dirty="0" smtClean="0"/>
+              <a:t>needed</a:t>
+            </a:r>
+            <a:endParaRPr lang="en-US" dirty="0" smtClean="0"/>
+          </a:p>
+          <a:p>
+            <a:r>
+              <a:rPr lang="en-US" dirty="0" smtClean="0"/>
+              <a:t>Which state </a:t>
+            </a:r>
+            <a:r>
+              <a:rPr lang="en-US" dirty="0"/>
+              <a:t>m</a:t>
+            </a:r>
+            <a:r>
+              <a:rPr lang="en-US" dirty="0" smtClean="0"/>
+              <a:t>achine is the simplest to implement from a Table?</a:t>
+            </a:r>
+          </a:p>
+          <a:p>
+            <a:pPr lvl="1"/>
+            <a:r>
+              <a:rPr lang="en-US" dirty="0" smtClean="0"/>
+              <a:t>Mealy Sequential Machine</a:t>
+            </a:r>
+          </a:p>
+          <a:p>
+            <a:r>
+              <a:rPr lang="en-US" dirty="0" smtClean="0"/>
+              <a:t>How we can realize many different timer in our project with just one time base?</a:t>
+            </a:r>
+          </a:p>
+          <a:p>
+            <a:pPr lvl="1"/>
+            <a:r>
+              <a:rPr lang="en-US" dirty="0" smtClean="0">
+                <a:solidFill>
+                  <a:schemeClr val="bg1"/>
+                </a:solidFill>
+              </a:rPr>
+              <a:t>With counter</a:t>
+            </a:r>
+            <a:endParaRPr lang="en-US" dirty="0">
+              <a:solidFill>
+                <a:schemeClr val="bg1"/>
+              </a:solidFill>
+            </a:endParaRPr>
+          </a:p>
+        </p:txBody>
+      </p:sp>
+    </p:spTree>
+    <p:extLst>
+      <p:ext uri="{BB962C8B-B14F-4D97-AF65-F5344CB8AC3E}">
+        <p14:creationId xmlns:p14="http://schemas.microsoft.com/office/powerpoint/2010/main" val="668944783"/>
+      </p:ext>
+    </p:extLst>
+  </p:cSld>
+  <p:clrMapOvr>
+    <a:masterClrMapping/>
+  </p:clrMapOvr>
+</p:sld>
+</file>
+
+<file path=ppt/slides/slide14.xml><?xml version="1.0" encoding="utf-8"?>
+<p:sld xmlns:a="http://schemas.openxmlformats.org/drawingml/2006/main" xmlns:r="http://schemas.openxmlformats.org/officeDocument/2006/relationships" xmlns:p="http://schemas.openxmlformats.org/presentationml/2006/main">
+  <p:cSld>
+    <p:spTree>
+      <p:nvGrpSpPr>
+        <p:cNvPr id="1" name=""/>
+        <p:cNvGrpSpPr/>
+        <p:nvPr/>
+      </p:nvGrpSpPr>
+      <p:grpSpPr>
+        <a:xfrm>
+          <a:off x="0" y="0"/>
+          <a:ext cx="0" cy="0"/>
+          <a:chOff x="0" y="0"/>
+          <a:chExt cx="0" cy="0"/>
+        </a:xfrm>
+      </p:grpSpPr>
+      <p:sp>
+        <p:nvSpPr>
+          <p:cNvPr id="2" name="Titel 1">
+            <a:extLst>
+              <a:ext uri="{FF2B5EF4-FFF2-40B4-BE49-F238E27FC236}">
+                <a16:creationId xmlns:a16="http://schemas.microsoft.com/office/drawing/2014/main" xmlns="" id="{0572EF2B-C8A0-48D8-9307-F6A9D11AE3F2}"/>
+              </a:ext>
+            </a:extLst>
+          </p:cNvPr>
+          <p:cNvSpPr>
+            <a:spLocks noGrp="1"/>
+          </p:cNvSpPr>
+          <p:nvPr>
+            <p:ph type="title"/>
+          </p:nvPr>
+        </p:nvSpPr>
+        <p:spPr/>
+        <p:txBody>
+          <a:bodyPr/>
+          <a:lstStyle/>
+          <a:p>
+            <a:r>
+              <a:rPr lang="en-US" dirty="0"/>
+              <a:t>Questions</a:t>
+            </a:r>
+          </a:p>
+        </p:txBody>
+      </p:sp>
+      <p:sp>
+        <p:nvSpPr>
+          <p:cNvPr id="3" name="Inhaltsplatzhalter 2">
+            <a:extLst>
+              <a:ext uri="{FF2B5EF4-FFF2-40B4-BE49-F238E27FC236}">
+                <a16:creationId xmlns:a16="http://schemas.microsoft.com/office/drawing/2014/main" xmlns="" id="{7B362E48-D48B-4AEF-872E-A51159F8C485}"/>
+              </a:ext>
+            </a:extLst>
+          </p:cNvPr>
+          <p:cNvSpPr>
+            <a:spLocks noGrp="1"/>
+          </p:cNvSpPr>
+          <p:nvPr>
+            <p:ph idx="1"/>
+          </p:nvPr>
+        </p:nvSpPr>
+        <p:spPr/>
+        <p:txBody>
+          <a:bodyPr>
+            <a:normAutofit fontScale="92500" lnSpcReduction="10000"/>
+          </a:bodyPr>
+          <a:lstStyle/>
+          <a:p>
+            <a:r>
+              <a:rPr lang="en-US" dirty="0"/>
+              <a:t>What is the job of the PLL in a microcontroller?</a:t>
+            </a:r>
+          </a:p>
+          <a:p>
+            <a:pPr lvl="1"/>
+            <a:r>
+              <a:rPr lang="en-US" dirty="0"/>
+              <a:t>Frequency multiplication</a:t>
+            </a:r>
+          </a:p>
+          <a:p>
+            <a:r>
+              <a:rPr lang="en-US" dirty="0"/>
+              <a:t>What two different types of clock sources are available for the system clock?</a:t>
+            </a:r>
+          </a:p>
+          <a:p>
+            <a:pPr lvl="1"/>
+            <a:r>
+              <a:rPr lang="en-US" dirty="0"/>
+              <a:t>Internal Clock</a:t>
+            </a:r>
+          </a:p>
+          <a:p>
+            <a:pPr lvl="1"/>
+            <a:r>
+              <a:rPr lang="en-US" dirty="0"/>
+              <a:t>External Crystal/Oscillator</a:t>
+            </a:r>
+          </a:p>
+          <a:p>
+            <a:r>
+              <a:rPr lang="en-US" dirty="0"/>
+              <a:t>What is the advantage of the function state Machine?</a:t>
+            </a:r>
+          </a:p>
+          <a:p>
+            <a:pPr lvl="1"/>
+            <a:r>
+              <a:rPr lang="en-US" dirty="0" smtClean="0"/>
+              <a:t>No </a:t>
+            </a:r>
+            <a:r>
+              <a:rPr lang="en-US" dirty="0"/>
+              <a:t>global variable </a:t>
+            </a:r>
+            <a:r>
+              <a:rPr lang="en-US" dirty="0" smtClean="0"/>
+              <a:t>needed</a:t>
+            </a:r>
+            <a:endParaRPr lang="en-US" dirty="0" smtClean="0"/>
+          </a:p>
+          <a:p>
+            <a:r>
+              <a:rPr lang="en-US" dirty="0" smtClean="0"/>
+              <a:t>Which state </a:t>
+            </a:r>
+            <a:r>
+              <a:rPr lang="en-US" dirty="0"/>
+              <a:t>m</a:t>
+            </a:r>
+            <a:r>
+              <a:rPr lang="en-US" dirty="0" smtClean="0"/>
+              <a:t>achine is the simplest to implement from a Table?</a:t>
+            </a:r>
+          </a:p>
+          <a:p>
+            <a:pPr lvl="1"/>
+            <a:r>
+              <a:rPr lang="en-US" dirty="0" smtClean="0"/>
+              <a:t>Mealy Sequential Machine</a:t>
+            </a:r>
+          </a:p>
+          <a:p>
+            <a:r>
+              <a:rPr lang="en-US" dirty="0" smtClean="0"/>
+              <a:t>How we can realize many different timer in our project with just one time base?</a:t>
+            </a:r>
+          </a:p>
+          <a:p>
+            <a:pPr lvl="1"/>
+            <a:r>
+              <a:rPr lang="en-US" dirty="0" smtClean="0"/>
+              <a:t>With counter</a:t>
+            </a:r>
+            <a:endParaRPr lang="en-US" dirty="0"/>
+          </a:p>
+        </p:txBody>
+      </p:sp>
+    </p:spTree>
+    <p:extLst>
+      <p:ext uri="{BB962C8B-B14F-4D97-AF65-F5344CB8AC3E}">
+        <p14:creationId xmlns:p14="http://schemas.microsoft.com/office/powerpoint/2010/main" val="878075836"/>
       </p:ext>
     </p:extLst>
   </p:cSld>
@@ -4687,7 +5231,7 @@
           <p:cNvPr id="4" name="Inhaltsplatzhalter 3">
             <a:extLst>
               <a:ext uri="{FF2B5EF4-FFF2-40B4-BE49-F238E27FC236}">
-                <a16:creationId xmlns:a16="http://schemas.microsoft.com/office/drawing/2014/main" id="{BD2AF860-7A41-4E2A-8B7D-2E138A9D18A8}"/>
+                <a16:creationId xmlns:a16="http://schemas.microsoft.com/office/drawing/2014/main" xmlns="" id="{BD2AF860-7A41-4E2A-8B7D-2E138A9D18A8}"/>
               </a:ext>
             </a:extLst>
           </p:cNvPr>
@@ -4719,7 +5263,7 @@
           <p:cNvPr id="5" name="Grafik 4">
             <a:extLst>
               <a:ext uri="{FF2B5EF4-FFF2-40B4-BE49-F238E27FC236}">
-                <a16:creationId xmlns:a16="http://schemas.microsoft.com/office/drawing/2014/main" id="{183222AB-F69D-483A-86E5-11BD51644E3B}"/>
+                <a16:creationId xmlns:a16="http://schemas.microsoft.com/office/drawing/2014/main" xmlns="" id="{183222AB-F69D-483A-86E5-11BD51644E3B}"/>
               </a:ext>
             </a:extLst>
           </p:cNvPr>
@@ -4749,7 +5293,7 @@
           <p:cNvPr id="6" name="Textfeld 5">
             <a:extLst>
               <a:ext uri="{FF2B5EF4-FFF2-40B4-BE49-F238E27FC236}">
-                <a16:creationId xmlns:a16="http://schemas.microsoft.com/office/drawing/2014/main" id="{610A3798-C5B9-4ED0-AFC6-08AC68FBFCDA}"/>
+                <a16:creationId xmlns:a16="http://schemas.microsoft.com/office/drawing/2014/main" xmlns="" id="{610A3798-C5B9-4ED0-AFC6-08AC68FBFCDA}"/>
               </a:ext>
             </a:extLst>
           </p:cNvPr>
@@ -4894,7 +5438,7 @@
           <p:cNvPr id="6" name="Textfeld 5">
             <a:extLst>
               <a:ext uri="{FF2B5EF4-FFF2-40B4-BE49-F238E27FC236}">
-                <a16:creationId xmlns:a16="http://schemas.microsoft.com/office/drawing/2014/main" id="{610A3798-C5B9-4ED0-AFC6-08AC68FBFCDA}"/>
+                <a16:creationId xmlns:a16="http://schemas.microsoft.com/office/drawing/2014/main" xmlns="" id="{610A3798-C5B9-4ED0-AFC6-08AC68FBFCDA}"/>
               </a:ext>
             </a:extLst>
           </p:cNvPr>
@@ -4918,7 +5462,7 @@
           <a:lstStyle/>
           <a:p>
             <a:pPr lvl="1"/>
-            <a:endParaRPr lang="en-US"/>
+            <a:endParaRPr lang="en-US" dirty="0"/>
           </a:p>
           <a:p>
             <a:pPr marL="285750" indent="-285750">
@@ -4926,7 +5470,7 @@
               <a:buChar char="•"/>
             </a:pPr>
             <a:r>
-              <a:rPr lang="en-US"/>
+              <a:rPr lang="en-US" dirty="0"/>
               <a:t>Disadvantage</a:t>
             </a:r>
           </a:p>
@@ -4936,7 +5480,7 @@
               <a:buChar char="•"/>
             </a:pPr>
             <a:r>
-              <a:rPr lang="en-US"/>
+              <a:rPr lang="en-US" dirty="0"/>
               <a:t>Global state variable</a:t>
             </a:r>
           </a:p>
@@ -4946,7 +5490,7 @@
               <a:buChar char="•"/>
             </a:pPr>
             <a:r>
-              <a:rPr lang="en-US"/>
+              <a:rPr lang="en-US" dirty="0"/>
               <a:t>Changing state outside processing</a:t>
             </a:r>
           </a:p>
@@ -4956,8 +5500,16 @@
               <a:buChar char="•"/>
             </a:pPr>
             <a:r>
-              <a:rPr lang="en-US"/>
-              <a:t>Volatile / reentancy!</a:t>
+              <a:rPr lang="en-US" dirty="0"/>
+              <a:t>Volatile / </a:t>
+            </a:r>
+            <a:r>
+              <a:rPr lang="en-US" dirty="0" smtClean="0"/>
+              <a:t>reentrancy</a:t>
+            </a:r>
+            <a:r>
+              <a:rPr lang="en-US" dirty="0"/>
+              <a:t>!</a:t>
             </a:r>
           </a:p>
           <a:p>
@@ -4965,7 +5517,7 @@
               <a:buFont typeface="Arial" panose="020B0604020202020204" pitchFamily="34" charset="0"/>
               <a:buChar char="•"/>
             </a:pPr>
-            <a:endParaRPr lang="en-US"/>
+            <a:endParaRPr lang="en-US" dirty="0"/>
           </a:p>
         </p:txBody>
       </p:sp>
@@ -4974,7 +5526,7 @@
           <p:cNvPr id="8" name="Grafik 7">
             <a:extLst>
               <a:ext uri="{FF2B5EF4-FFF2-40B4-BE49-F238E27FC236}">
-                <a16:creationId xmlns:a16="http://schemas.microsoft.com/office/drawing/2014/main" id="{3ADC2005-D6A8-44A2-8815-833988CE2D84}"/>
+                <a16:creationId xmlns:a16="http://schemas.microsoft.com/office/drawing/2014/main" xmlns="" id="{3ADC2005-D6A8-44A2-8815-833988CE2D84}"/>
               </a:ext>
             </a:extLst>
           </p:cNvPr>
@@ -5004,7 +5556,7 @@
           <p:cNvPr id="9" name="Grafik 8">
             <a:extLst>
               <a:ext uri="{FF2B5EF4-FFF2-40B4-BE49-F238E27FC236}">
-                <a16:creationId xmlns:a16="http://schemas.microsoft.com/office/drawing/2014/main" id="{E8BFA6DB-D33B-408E-9046-76FAF2B0770D}"/>
+                <a16:creationId xmlns:a16="http://schemas.microsoft.com/office/drawing/2014/main" xmlns="" id="{E8BFA6DB-D33B-408E-9046-76FAF2B0770D}"/>
               </a:ext>
             </a:extLst>
           </p:cNvPr>
@@ -5034,7 +5586,7 @@
           <p:cNvPr id="10" name="Grafik 9">
             <a:extLst>
               <a:ext uri="{FF2B5EF4-FFF2-40B4-BE49-F238E27FC236}">
-                <a16:creationId xmlns:a16="http://schemas.microsoft.com/office/drawing/2014/main" id="{B04D3098-A9C6-4B8F-9685-D9C75760D591}"/>
+                <a16:creationId xmlns:a16="http://schemas.microsoft.com/office/drawing/2014/main" xmlns="" id="{B04D3098-A9C6-4B8F-9685-D9C75760D591}"/>
               </a:ext>
             </a:extLst>
           </p:cNvPr>
@@ -5094,7 +5646,7 @@
           <p:cNvPr id="2" name="Titel 1">
             <a:extLst>
               <a:ext uri="{FF2B5EF4-FFF2-40B4-BE49-F238E27FC236}">
-                <a16:creationId xmlns:a16="http://schemas.microsoft.com/office/drawing/2014/main" id="{BF7E912D-C323-4275-826A-9BF6BA108F54}"/>
+                <a16:creationId xmlns:a16="http://schemas.microsoft.com/office/drawing/2014/main" xmlns="" id="{BF7E912D-C323-4275-826A-9BF6BA108F54}"/>
               </a:ext>
             </a:extLst>
           </p:cNvPr>
@@ -5122,7 +5674,7 @@
           <p:cNvPr id="4" name="Grafik 3">
             <a:extLst>
               <a:ext uri="{FF2B5EF4-FFF2-40B4-BE49-F238E27FC236}">
-                <a16:creationId xmlns:a16="http://schemas.microsoft.com/office/drawing/2014/main" id="{5E405BC4-7943-40F2-93E8-0BE610FC4A14}"/>
+                <a16:creationId xmlns:a16="http://schemas.microsoft.com/office/drawing/2014/main" xmlns="" id="{5E405BC4-7943-40F2-93E8-0BE610FC4A14}"/>
               </a:ext>
             </a:extLst>
           </p:cNvPr>
@@ -5152,7 +5704,7 @@
           <p:cNvPr id="5" name="Grafik 4">
             <a:extLst>
               <a:ext uri="{FF2B5EF4-FFF2-40B4-BE49-F238E27FC236}">
-                <a16:creationId xmlns:a16="http://schemas.microsoft.com/office/drawing/2014/main" id="{280BE16D-443F-497C-BFC9-92B7382B4F44}"/>
+                <a16:creationId xmlns:a16="http://schemas.microsoft.com/office/drawing/2014/main" xmlns="" id="{280BE16D-443F-497C-BFC9-92B7382B4F44}"/>
               </a:ext>
             </a:extLst>
           </p:cNvPr>
@@ -5182,7 +5734,7 @@
           <p:cNvPr id="7" name="Textfeld 6">
             <a:extLst>
               <a:ext uri="{FF2B5EF4-FFF2-40B4-BE49-F238E27FC236}">
-                <a16:creationId xmlns:a16="http://schemas.microsoft.com/office/drawing/2014/main" id="{BB521CCB-C0B7-4389-BEA9-AD45D446C6AB}"/>
+                <a16:creationId xmlns:a16="http://schemas.microsoft.com/office/drawing/2014/main" xmlns="" id="{BB521CCB-C0B7-4389-BEA9-AD45D446C6AB}"/>
               </a:ext>
             </a:extLst>
           </p:cNvPr>
@@ -5221,7 +5773,7 @@
           <p:cNvPr id="8" name="Textfeld 7">
             <a:extLst>
               <a:ext uri="{FF2B5EF4-FFF2-40B4-BE49-F238E27FC236}">
-                <a16:creationId xmlns:a16="http://schemas.microsoft.com/office/drawing/2014/main" id="{3F342FF8-688D-42C9-9418-0C902D2083AC}"/>
+                <a16:creationId xmlns:a16="http://schemas.microsoft.com/office/drawing/2014/main" xmlns="" id="{3F342FF8-688D-42C9-9418-0C902D2083AC}"/>
               </a:ext>
             </a:extLst>
           </p:cNvPr>
@@ -5260,7 +5812,7 @@
           <p:cNvPr id="10" name="Textfeld 9">
             <a:extLst>
               <a:ext uri="{FF2B5EF4-FFF2-40B4-BE49-F238E27FC236}">
-                <a16:creationId xmlns:a16="http://schemas.microsoft.com/office/drawing/2014/main" id="{D8482A9D-E21D-490C-84A7-19DAF0D37A4D}"/>
+                <a16:creationId xmlns:a16="http://schemas.microsoft.com/office/drawing/2014/main" xmlns="" id="{D8482A9D-E21D-490C-84A7-19DAF0D37A4D}"/>
               </a:ext>
             </a:extLst>
           </p:cNvPr>
@@ -5397,7 +5949,7 @@
           <p:cNvPr id="2" name="Titel 1">
             <a:extLst>
               <a:ext uri="{FF2B5EF4-FFF2-40B4-BE49-F238E27FC236}">
-                <a16:creationId xmlns:a16="http://schemas.microsoft.com/office/drawing/2014/main" id="{E75542C9-7F16-43B8-B8F8-D5B03DCFE7E4}"/>
+                <a16:creationId xmlns:a16="http://schemas.microsoft.com/office/drawing/2014/main" xmlns="" id="{E75542C9-7F16-43B8-B8F8-D5B03DCFE7E4}"/>
               </a:ext>
             </a:extLst>
           </p:cNvPr>
@@ -5434,7 +5986,7 @@
           <p:cNvPr id="4" name="Grafik 3">
             <a:extLst>
               <a:ext uri="{FF2B5EF4-FFF2-40B4-BE49-F238E27FC236}">
-                <a16:creationId xmlns:a16="http://schemas.microsoft.com/office/drawing/2014/main" id="{655D3A51-966D-44AC-AF73-7A7C8C228C6D}"/>
+                <a16:creationId xmlns:a16="http://schemas.microsoft.com/office/drawing/2014/main" xmlns="" id="{655D3A51-966D-44AC-AF73-7A7C8C228C6D}"/>
               </a:ext>
             </a:extLst>
           </p:cNvPr>
@@ -5464,7 +6016,7 @@
           <p:cNvPr id="5" name="Grafik 4">
             <a:extLst>
               <a:ext uri="{FF2B5EF4-FFF2-40B4-BE49-F238E27FC236}">
-                <a16:creationId xmlns:a16="http://schemas.microsoft.com/office/drawing/2014/main" id="{E1D4893F-0ED0-46C2-8421-8EF8D8B0A464}"/>
+                <a16:creationId xmlns:a16="http://schemas.microsoft.com/office/drawing/2014/main" xmlns="" id="{E1D4893F-0ED0-46C2-8421-8EF8D8B0A464}"/>
               </a:ext>
             </a:extLst>
           </p:cNvPr>
@@ -5494,7 +6046,7 @@
           <p:cNvPr id="6" name="Tabelle 5">
             <a:extLst>
               <a:ext uri="{FF2B5EF4-FFF2-40B4-BE49-F238E27FC236}">
-                <a16:creationId xmlns:a16="http://schemas.microsoft.com/office/drawing/2014/main" id="{401B42BA-3C88-435D-82BB-BDB56F02A8C5}"/>
+                <a16:creationId xmlns:a16="http://schemas.microsoft.com/office/drawing/2014/main" xmlns="" id="{401B42BA-3C88-435D-82BB-BDB56F02A8C5}"/>
               </a:ext>
             </a:extLst>
           </p:cNvPr>
@@ -5523,21 +6075,21 @@
                 <a:gridCol w="1008112">
                   <a:extLst>
                     <a:ext uri="{9D8B030D-6E8A-4147-A177-3AD203B41FA5}">
-                      <a16:colId xmlns:a16="http://schemas.microsoft.com/office/drawing/2014/main" val="2908335620"/>
+                      <a16:colId xmlns:a16="http://schemas.microsoft.com/office/drawing/2014/main" xmlns="" val="2908335620"/>
                     </a:ext>
                   </a:extLst>
                 </a:gridCol>
                 <a:gridCol w="864096">
                   <a:extLst>
                     <a:ext uri="{9D8B030D-6E8A-4147-A177-3AD203B41FA5}">
-                      <a16:colId xmlns:a16="http://schemas.microsoft.com/office/drawing/2014/main" val="1892311106"/>
+                      <a16:colId xmlns:a16="http://schemas.microsoft.com/office/drawing/2014/main" xmlns="" val="1892311106"/>
                     </a:ext>
                   </a:extLst>
                 </a:gridCol>
                 <a:gridCol w="864096">
                   <a:extLst>
                     <a:ext uri="{9D8B030D-6E8A-4147-A177-3AD203B41FA5}">
-                      <a16:colId xmlns:a16="http://schemas.microsoft.com/office/drawing/2014/main" val="2638969272"/>
+                      <a16:colId xmlns:a16="http://schemas.microsoft.com/office/drawing/2014/main" xmlns="" val="2638969272"/>
                     </a:ext>
                   </a:extLst>
                 </a:gridCol>
@@ -5584,7 +6136,7 @@
                 </a:tc>
                 <a:extLst>
                   <a:ext uri="{0D108BD9-81ED-4DB2-BD59-A6C34878D82A}">
-                    <a16:rowId xmlns:a16="http://schemas.microsoft.com/office/drawing/2014/main" val="130431969"/>
+                    <a16:rowId xmlns:a16="http://schemas.microsoft.com/office/drawing/2014/main" xmlns="" val="130431969"/>
                   </a:ext>
                 </a:extLst>
               </a:tr>
@@ -5630,7 +6182,7 @@
                 </a:tc>
                 <a:extLst>
                   <a:ext uri="{0D108BD9-81ED-4DB2-BD59-A6C34878D82A}">
-                    <a16:rowId xmlns:a16="http://schemas.microsoft.com/office/drawing/2014/main" val="3302135310"/>
+                    <a16:rowId xmlns:a16="http://schemas.microsoft.com/office/drawing/2014/main" xmlns="" val="3302135310"/>
                   </a:ext>
                 </a:extLst>
               </a:tr>
@@ -5676,7 +6228,7 @@
                 </a:tc>
                 <a:extLst>
                   <a:ext uri="{0D108BD9-81ED-4DB2-BD59-A6C34878D82A}">
-                    <a16:rowId xmlns:a16="http://schemas.microsoft.com/office/drawing/2014/main" val="1894498324"/>
+                    <a16:rowId xmlns:a16="http://schemas.microsoft.com/office/drawing/2014/main" xmlns="" val="1894498324"/>
                   </a:ext>
                 </a:extLst>
               </a:tr>
@@ -5691,7 +6243,7 @@
               <p14:cNvPr id="8" name="Freihand 7">
                 <a:extLst>
                   <a:ext uri="{FF2B5EF4-FFF2-40B4-BE49-F238E27FC236}">
-                    <a16:creationId xmlns:a16="http://schemas.microsoft.com/office/drawing/2014/main" id="{FC62FF14-DE79-42D4-9EA8-DD14E1382526}"/>
+                    <a16:creationId xmlns:a16="http://schemas.microsoft.com/office/drawing/2014/main" xmlns="" id="{FC62FF14-DE79-42D4-9EA8-DD14E1382526}"/>
                   </a:ext>
                 </a:extLst>
               </p14:cNvPr>
@@ -5742,7 +6294,7 @@
               <p14:cNvPr id="9" name="Freihand 8">
                 <a:extLst>
                   <a:ext uri="{FF2B5EF4-FFF2-40B4-BE49-F238E27FC236}">
-                    <a16:creationId xmlns:a16="http://schemas.microsoft.com/office/drawing/2014/main" id="{CD1B280D-A593-4FAD-BE35-9C3918877C5E}"/>
+                    <a16:creationId xmlns:a16="http://schemas.microsoft.com/office/drawing/2014/main" xmlns="" id="{CD1B280D-A593-4FAD-BE35-9C3918877C5E}"/>
                   </a:ext>
                 </a:extLst>
               </p14:cNvPr>
@@ -5793,7 +6345,7 @@
               <p14:cNvPr id="10" name="Freihand 9">
                 <a:extLst>
                   <a:ext uri="{FF2B5EF4-FFF2-40B4-BE49-F238E27FC236}">
-                    <a16:creationId xmlns:a16="http://schemas.microsoft.com/office/drawing/2014/main" id="{C7D4E743-BF91-4615-AF54-56584CBED5AF}"/>
+                    <a16:creationId xmlns:a16="http://schemas.microsoft.com/office/drawing/2014/main" xmlns="" id="{C7D4E743-BF91-4615-AF54-56584CBED5AF}"/>
                   </a:ext>
                 </a:extLst>
               </p14:cNvPr>
@@ -5844,7 +6396,7 @@
               <p14:cNvPr id="11" name="Freihand 10">
                 <a:extLst>
                   <a:ext uri="{FF2B5EF4-FFF2-40B4-BE49-F238E27FC236}">
-                    <a16:creationId xmlns:a16="http://schemas.microsoft.com/office/drawing/2014/main" id="{E9EFD05F-914B-44EC-9D0D-4F90AF5712A9}"/>
+                    <a16:creationId xmlns:a16="http://schemas.microsoft.com/office/drawing/2014/main" xmlns="" id="{E9EFD05F-914B-44EC-9D0D-4F90AF5712A9}"/>
                   </a:ext>
                 </a:extLst>
               </p14:cNvPr>
@@ -5895,7 +6447,7 @@
               <p14:cNvPr id="12" name="Freihand 11">
                 <a:extLst>
                   <a:ext uri="{FF2B5EF4-FFF2-40B4-BE49-F238E27FC236}">
-                    <a16:creationId xmlns:a16="http://schemas.microsoft.com/office/drawing/2014/main" id="{B6FE8826-766F-46AB-B09F-4DA911681F2F}"/>
+                    <a16:creationId xmlns:a16="http://schemas.microsoft.com/office/drawing/2014/main" xmlns="" id="{B6FE8826-766F-46AB-B09F-4DA911681F2F}"/>
                   </a:ext>
                 </a:extLst>
               </p14:cNvPr>
@@ -5946,7 +6498,7 @@
               <p14:cNvPr id="13" name="Freihand 12">
                 <a:extLst>
                   <a:ext uri="{FF2B5EF4-FFF2-40B4-BE49-F238E27FC236}">
-                    <a16:creationId xmlns:a16="http://schemas.microsoft.com/office/drawing/2014/main" id="{76B3A026-6D09-4BA9-8C6C-AD635E2872A2}"/>
+                    <a16:creationId xmlns:a16="http://schemas.microsoft.com/office/drawing/2014/main" xmlns="" id="{76B3A026-6D09-4BA9-8C6C-AD635E2872A2}"/>
                   </a:ext>
                 </a:extLst>
               </p14:cNvPr>
@@ -5997,7 +6549,7 @@
               <p14:cNvPr id="14" name="Freihand 13">
                 <a:extLst>
                   <a:ext uri="{FF2B5EF4-FFF2-40B4-BE49-F238E27FC236}">
-                    <a16:creationId xmlns:a16="http://schemas.microsoft.com/office/drawing/2014/main" id="{DCF1070F-89ED-492A-99A4-3C262F6F8ED3}"/>
+                    <a16:creationId xmlns:a16="http://schemas.microsoft.com/office/drawing/2014/main" xmlns="" id="{DCF1070F-89ED-492A-99A4-3C262F6F8ED3}"/>
                   </a:ext>
                 </a:extLst>
               </p14:cNvPr>
@@ -6048,7 +6600,7 @@
               <p14:cNvPr id="15" name="Freihand 14">
                 <a:extLst>
                   <a:ext uri="{FF2B5EF4-FFF2-40B4-BE49-F238E27FC236}">
-                    <a16:creationId xmlns:a16="http://schemas.microsoft.com/office/drawing/2014/main" id="{63F450F8-1457-4DD4-A178-B22D78541730}"/>
+                    <a16:creationId xmlns:a16="http://schemas.microsoft.com/office/drawing/2014/main" xmlns="" id="{63F450F8-1457-4DD4-A178-B22D78541730}"/>
                   </a:ext>
                 </a:extLst>
               </p14:cNvPr>
@@ -6127,7 +6679,7 @@
           <p:cNvPr id="13" name="Rechteck 12">
             <a:extLst>
               <a:ext uri="{FF2B5EF4-FFF2-40B4-BE49-F238E27FC236}">
-                <a16:creationId xmlns:a16="http://schemas.microsoft.com/office/drawing/2014/main" id="{4B15D959-5069-4CF0-9A78-3E94928EAB1C}"/>
+                <a16:creationId xmlns:a16="http://schemas.microsoft.com/office/drawing/2014/main" xmlns="" id="{4B15D959-5069-4CF0-9A78-3E94928EAB1C}"/>
               </a:ext>
             </a:extLst>
           </p:cNvPr>
@@ -6179,7 +6731,7 @@
           <p:cNvPr id="2" name="Titel 1">
             <a:extLst>
               <a:ext uri="{FF2B5EF4-FFF2-40B4-BE49-F238E27FC236}">
-                <a16:creationId xmlns:a16="http://schemas.microsoft.com/office/drawing/2014/main" id="{3A7E6F38-19DE-4F0B-93BA-8B78E48E1E47}"/>
+                <a16:creationId xmlns:a16="http://schemas.microsoft.com/office/drawing/2014/main" xmlns="" id="{3A7E6F38-19DE-4F0B-93BA-8B78E48E1E47}"/>
               </a:ext>
             </a:extLst>
           </p:cNvPr>
@@ -6207,7 +6759,7 @@
           <p:cNvPr id="4" name="Grafik 3">
             <a:extLst>
               <a:ext uri="{FF2B5EF4-FFF2-40B4-BE49-F238E27FC236}">
-                <a16:creationId xmlns:a16="http://schemas.microsoft.com/office/drawing/2014/main" id="{587BD8C3-9767-48F9-AF37-DC324A8D468D}"/>
+                <a16:creationId xmlns:a16="http://schemas.microsoft.com/office/drawing/2014/main" xmlns="" id="{587BD8C3-9767-48F9-AF37-DC324A8D468D}"/>
               </a:ext>
             </a:extLst>
           </p:cNvPr>
@@ -6237,7 +6789,7 @@
           <p:cNvPr id="5" name="Grafik 4">
             <a:extLst>
               <a:ext uri="{FF2B5EF4-FFF2-40B4-BE49-F238E27FC236}">
-                <a16:creationId xmlns:a16="http://schemas.microsoft.com/office/drawing/2014/main" id="{D8F728C3-321C-4606-A75C-6AB28FB76186}"/>
+                <a16:creationId xmlns:a16="http://schemas.microsoft.com/office/drawing/2014/main" xmlns="" id="{D8F728C3-321C-4606-A75C-6AB28FB76186}"/>
               </a:ext>
             </a:extLst>
           </p:cNvPr>
@@ -6267,7 +6819,7 @@
           <p:cNvPr id="6" name="Textfeld 5">
             <a:extLst>
               <a:ext uri="{FF2B5EF4-FFF2-40B4-BE49-F238E27FC236}">
-                <a16:creationId xmlns:a16="http://schemas.microsoft.com/office/drawing/2014/main" id="{86C28572-8363-4667-9B80-F59113618FBA}"/>
+                <a16:creationId xmlns:a16="http://schemas.microsoft.com/office/drawing/2014/main" xmlns="" id="{86C28572-8363-4667-9B80-F59113618FBA}"/>
               </a:ext>
             </a:extLst>
           </p:cNvPr>
@@ -6306,7 +6858,7 @@
           <p:cNvPr id="7" name="Textfeld 6">
             <a:extLst>
               <a:ext uri="{FF2B5EF4-FFF2-40B4-BE49-F238E27FC236}">
-                <a16:creationId xmlns:a16="http://schemas.microsoft.com/office/drawing/2014/main" id="{55D490E8-3450-4396-901D-F5E7BA0357F8}"/>
+                <a16:creationId xmlns:a16="http://schemas.microsoft.com/office/drawing/2014/main" xmlns="" id="{55D490E8-3450-4396-901D-F5E7BA0357F8}"/>
               </a:ext>
             </a:extLst>
           </p:cNvPr>
@@ -6345,7 +6897,7 @@
           <p:cNvPr id="9" name="Grafik 8">
             <a:extLst>
               <a:ext uri="{FF2B5EF4-FFF2-40B4-BE49-F238E27FC236}">
-                <a16:creationId xmlns:a16="http://schemas.microsoft.com/office/drawing/2014/main" id="{F1DCB80B-3875-4574-B62E-1DF6108F025D}"/>
+                <a16:creationId xmlns:a16="http://schemas.microsoft.com/office/drawing/2014/main" xmlns="" id="{F1DCB80B-3875-4574-B62E-1DF6108F025D}"/>
               </a:ext>
             </a:extLst>
           </p:cNvPr>
@@ -6375,7 +6927,7 @@
           <p:cNvPr id="10" name="Textfeld 9">
             <a:extLst>
               <a:ext uri="{FF2B5EF4-FFF2-40B4-BE49-F238E27FC236}">
-                <a16:creationId xmlns:a16="http://schemas.microsoft.com/office/drawing/2014/main" id="{05841DED-B02D-4CCF-AFE2-E952DCEEE462}"/>
+                <a16:creationId xmlns:a16="http://schemas.microsoft.com/office/drawing/2014/main" xmlns="" id="{05841DED-B02D-4CCF-AFE2-E952DCEEE462}"/>
               </a:ext>
             </a:extLst>
           </p:cNvPr>
@@ -6414,7 +6966,7 @@
           <p:cNvPr id="11" name="Textfeld 10">
             <a:extLst>
               <a:ext uri="{FF2B5EF4-FFF2-40B4-BE49-F238E27FC236}">
-                <a16:creationId xmlns:a16="http://schemas.microsoft.com/office/drawing/2014/main" id="{33A5B1EA-0856-4815-9846-EB3EC6622A90}"/>
+                <a16:creationId xmlns:a16="http://schemas.microsoft.com/office/drawing/2014/main" xmlns="" id="{33A5B1EA-0856-4815-9846-EB3EC6622A90}"/>
               </a:ext>
             </a:extLst>
           </p:cNvPr>
@@ -6453,7 +7005,7 @@
           <p:cNvPr id="12" name="Textfeld 11">
             <a:extLst>
               <a:ext uri="{FF2B5EF4-FFF2-40B4-BE49-F238E27FC236}">
-                <a16:creationId xmlns:a16="http://schemas.microsoft.com/office/drawing/2014/main" id="{01EF49E5-E26B-4C1C-86C9-70CC251EFD58}"/>
+                <a16:creationId xmlns:a16="http://schemas.microsoft.com/office/drawing/2014/main" xmlns="" id="{01EF49E5-E26B-4C1C-86C9-70CC251EFD58}"/>
               </a:ext>
             </a:extLst>
           </p:cNvPr>
@@ -6522,7 +7074,7 @@
           <p:cNvPr id="2" name="Titel 1">
             <a:extLst>
               <a:ext uri="{FF2B5EF4-FFF2-40B4-BE49-F238E27FC236}">
-                <a16:creationId xmlns:a16="http://schemas.microsoft.com/office/drawing/2014/main" id="{58F9D976-1CA1-4582-911A-BA1C4AC67ABE}"/>
+                <a16:creationId xmlns:a16="http://schemas.microsoft.com/office/drawing/2014/main" xmlns="" id="{58F9D976-1CA1-4582-911A-BA1C4AC67ABE}"/>
               </a:ext>
             </a:extLst>
           </p:cNvPr>
@@ -6550,7 +7102,7 @@
           <p:cNvPr id="4" name="Grafik 3">
             <a:extLst>
               <a:ext uri="{FF2B5EF4-FFF2-40B4-BE49-F238E27FC236}">
-                <a16:creationId xmlns:a16="http://schemas.microsoft.com/office/drawing/2014/main" id="{12D1800E-8D94-4FF7-9F05-5C21CFC5B6CA}"/>
+                <a16:creationId xmlns:a16="http://schemas.microsoft.com/office/drawing/2014/main" xmlns="" id="{12D1800E-8D94-4FF7-9F05-5C21CFC5B6CA}"/>
               </a:ext>
             </a:extLst>
           </p:cNvPr>
@@ -6580,7 +7132,7 @@
           <p:cNvPr id="5" name="Grafik 4">
             <a:extLst>
               <a:ext uri="{FF2B5EF4-FFF2-40B4-BE49-F238E27FC236}">
-                <a16:creationId xmlns:a16="http://schemas.microsoft.com/office/drawing/2014/main" id="{21EAA327-E22A-4C77-A7F2-9E414EB9E602}"/>
+                <a16:creationId xmlns:a16="http://schemas.microsoft.com/office/drawing/2014/main" xmlns="" id="{21EAA327-E22A-4C77-A7F2-9E414EB9E602}"/>
               </a:ext>
             </a:extLst>
           </p:cNvPr>
@@ -6610,7 +7162,7 @@
           <p:cNvPr id="6" name="Grafik 5">
             <a:extLst>
               <a:ext uri="{FF2B5EF4-FFF2-40B4-BE49-F238E27FC236}">
-                <a16:creationId xmlns:a16="http://schemas.microsoft.com/office/drawing/2014/main" id="{F50FE83D-F477-4E38-BD72-F7BBBBEA6775}"/>
+                <a16:creationId xmlns:a16="http://schemas.microsoft.com/office/drawing/2014/main" xmlns="" id="{F50FE83D-F477-4E38-BD72-F7BBBBEA6775}"/>
               </a:ext>
             </a:extLst>
           </p:cNvPr>
@@ -6670,7 +7222,7 @@
           <p:cNvPr id="2" name="Titel 1">
             <a:extLst>
               <a:ext uri="{FF2B5EF4-FFF2-40B4-BE49-F238E27FC236}">
-                <a16:creationId xmlns:a16="http://schemas.microsoft.com/office/drawing/2014/main" id="{0572EF2B-C8A0-48D8-9307-F6A9D11AE3F2}"/>
+                <a16:creationId xmlns:a16="http://schemas.microsoft.com/office/drawing/2014/main" xmlns="" id="{0572EF2B-C8A0-48D8-9307-F6A9D11AE3F2}"/>
               </a:ext>
             </a:extLst>
           </p:cNvPr>
@@ -6698,7 +7250,7 @@
           <p:cNvPr id="3" name="Inhaltsplatzhalter 2">
             <a:extLst>
               <a:ext uri="{FF2B5EF4-FFF2-40B4-BE49-F238E27FC236}">
-                <a16:creationId xmlns:a16="http://schemas.microsoft.com/office/drawing/2014/main" id="{7B362E48-D48B-4AEF-872E-A51159F8C485}"/>
+                <a16:creationId xmlns:a16="http://schemas.microsoft.com/office/drawing/2014/main" xmlns="" id="{7B362E48-D48B-4AEF-872E-A51159F8C485}"/>
               </a:ext>
             </a:extLst>
           </p:cNvPr>
@@ -6711,7 +7263,9 @@
         </p:nvSpPr>
         <p:spPr/>
         <p:txBody>
-          <a:bodyPr/>
+          <a:bodyPr>
+            <a:normAutofit fontScale="92500" lnSpcReduction="10000"/>
+          </a:bodyPr>
           <a:lstStyle/>
           <a:p>
             <a:r>
@@ -6767,13 +7321,81 @@
           <a:p>
             <a:pPr lvl="1"/>
             <a:r>
+              <a:rPr lang="en-US" dirty="0" smtClean="0">
+                <a:solidFill>
+                  <a:schemeClr val="bg1"/>
+                </a:solidFill>
+              </a:rPr>
+              <a:t> </a:t>
+            </a:r>
+            <a:r>
               <a:rPr lang="en-US" dirty="0">
                 <a:solidFill>
                   <a:schemeClr val="bg1"/>
                 </a:solidFill>
               </a:rPr>
-              <a:t>No global variable needed</a:t>
-            </a:r>
+              <a:t>No global variable </a:t>
+            </a:r>
+            <a:r>
+              <a:rPr lang="en-US" dirty="0" smtClean="0">
+                <a:solidFill>
+                  <a:schemeClr val="bg1"/>
+                </a:solidFill>
+              </a:rPr>
+              <a:t>needed</a:t>
+            </a:r>
+            <a:endParaRPr lang="en-US" dirty="0" smtClean="0">
+              <a:solidFill>
+                <a:schemeClr val="bg1"/>
+              </a:solidFill>
+            </a:endParaRPr>
+          </a:p>
+          <a:p>
+            <a:r>
+              <a:rPr lang="en-US" dirty="0" smtClean="0"/>
+              <a:t>Which state </a:t>
+            </a:r>
+            <a:r>
+              <a:rPr lang="en-US" dirty="0"/>
+              <a:t>m</a:t>
+            </a:r>
+            <a:r>
+              <a:rPr lang="en-US" dirty="0" smtClean="0"/>
+              <a:t>achine is the simplest to implement from a Table?</a:t>
+            </a:r>
+          </a:p>
+          <a:p>
+            <a:pPr lvl="1"/>
+            <a:r>
+              <a:rPr lang="en-US" dirty="0" smtClean="0">
+                <a:solidFill>
+                  <a:schemeClr val="bg1"/>
+                </a:solidFill>
+              </a:rPr>
+              <a:t>Mealy Sequential Machine</a:t>
+            </a:r>
+          </a:p>
+          <a:p>
+            <a:r>
+              <a:rPr lang="en-US" dirty="0" smtClean="0"/>
+              <a:t>How we can realize many different timer in our project with just one time base?</a:t>
+            </a:r>
+          </a:p>
+          <a:p>
+            <a:pPr lvl="1"/>
+            <a:r>
+              <a:rPr lang="en-US" dirty="0" smtClean="0">
+                <a:solidFill>
+                  <a:schemeClr val="bg1"/>
+                </a:solidFill>
+              </a:rPr>
+              <a:t>With counter</a:t>
+            </a:r>
+            <a:endParaRPr lang="en-US" dirty="0">
+              <a:solidFill>
+                <a:schemeClr val="bg1"/>
+              </a:solidFill>
+            </a:endParaRPr>
           </a:p>
         </p:txBody>
       </p:sp>

</xml_diff>